<commit_message>
finished talk for Dec 15 RR meeting in SAC
</commit_message>
<xml_diff>
--- a/Examples/AgWaterUse/Options.pptx
+++ b/Examples/AgWaterUse/Options.pptx
@@ -6,8 +6,9 @@
   </p:sldMasterIdLst>
   <p:sldIdLst>
     <p:sldId id="256" r:id="rId2"/>
-    <p:sldId id="257" r:id="rId3"/>
-    <p:sldId id="258" r:id="rId4"/>
+    <p:sldId id="259" r:id="rId3"/>
+    <p:sldId id="257" r:id="rId4"/>
+    <p:sldId id="258" r:id="rId5"/>
   </p:sldIdLst>
   <p:sldSz cx="12192000" cy="6858000"/>
   <p:notesSz cx="6858000" cy="9144000"/>
@@ -245,7 +246,7 @@
           <a:p>
             <a:fld id="{652F1E81-1D68-4626-9ECC-923EDADFDCD3}" type="datetimeFigureOut">
               <a:rPr lang="en-US" smtClean="0"/>
-              <a:t>11/15/2017</a:t>
+              <a:t>12/13/2017</a:t>
             </a:fld>
             <a:endParaRPr lang="en-US"/>
           </a:p>
@@ -415,7 +416,7 @@
           <a:p>
             <a:fld id="{652F1E81-1D68-4626-9ECC-923EDADFDCD3}" type="datetimeFigureOut">
               <a:rPr lang="en-US" smtClean="0"/>
-              <a:t>11/15/2017</a:t>
+              <a:t>12/13/2017</a:t>
             </a:fld>
             <a:endParaRPr lang="en-US"/>
           </a:p>
@@ -595,7 +596,7 @@
           <a:p>
             <a:fld id="{652F1E81-1D68-4626-9ECC-923EDADFDCD3}" type="datetimeFigureOut">
               <a:rPr lang="en-US" smtClean="0"/>
-              <a:t>11/15/2017</a:t>
+              <a:t>12/13/2017</a:t>
             </a:fld>
             <a:endParaRPr lang="en-US"/>
           </a:p>
@@ -765,7 +766,7 @@
           <a:p>
             <a:fld id="{652F1E81-1D68-4626-9ECC-923EDADFDCD3}" type="datetimeFigureOut">
               <a:rPr lang="en-US" smtClean="0"/>
-              <a:t>11/15/2017</a:t>
+              <a:t>12/13/2017</a:t>
             </a:fld>
             <a:endParaRPr lang="en-US"/>
           </a:p>
@@ -1011,7 +1012,7 @@
           <a:p>
             <a:fld id="{652F1E81-1D68-4626-9ECC-923EDADFDCD3}" type="datetimeFigureOut">
               <a:rPr lang="en-US" smtClean="0"/>
-              <a:t>11/15/2017</a:t>
+              <a:t>12/13/2017</a:t>
             </a:fld>
             <a:endParaRPr lang="en-US"/>
           </a:p>
@@ -1243,7 +1244,7 @@
           <a:p>
             <a:fld id="{652F1E81-1D68-4626-9ECC-923EDADFDCD3}" type="datetimeFigureOut">
               <a:rPr lang="en-US" smtClean="0"/>
-              <a:t>11/15/2017</a:t>
+              <a:t>12/13/2017</a:t>
             </a:fld>
             <a:endParaRPr lang="en-US"/>
           </a:p>
@@ -1610,7 +1611,7 @@
           <a:p>
             <a:fld id="{652F1E81-1D68-4626-9ECC-923EDADFDCD3}" type="datetimeFigureOut">
               <a:rPr lang="en-US" smtClean="0"/>
-              <a:t>11/15/2017</a:t>
+              <a:t>12/13/2017</a:t>
             </a:fld>
             <a:endParaRPr lang="en-US"/>
           </a:p>
@@ -1728,7 +1729,7 @@
           <a:p>
             <a:fld id="{652F1E81-1D68-4626-9ECC-923EDADFDCD3}" type="datetimeFigureOut">
               <a:rPr lang="en-US" smtClean="0"/>
-              <a:t>11/15/2017</a:t>
+              <a:t>12/13/2017</a:t>
             </a:fld>
             <a:endParaRPr lang="en-US"/>
           </a:p>
@@ -1823,7 +1824,7 @@
           <a:p>
             <a:fld id="{652F1E81-1D68-4626-9ECC-923EDADFDCD3}" type="datetimeFigureOut">
               <a:rPr lang="en-US" smtClean="0"/>
-              <a:t>11/15/2017</a:t>
+              <a:t>12/13/2017</a:t>
             </a:fld>
             <a:endParaRPr lang="en-US"/>
           </a:p>
@@ -2100,7 +2101,7 @@
           <a:p>
             <a:fld id="{652F1E81-1D68-4626-9ECC-923EDADFDCD3}" type="datetimeFigureOut">
               <a:rPr lang="en-US" smtClean="0"/>
-              <a:t>11/15/2017</a:t>
+              <a:t>12/13/2017</a:t>
             </a:fld>
             <a:endParaRPr lang="en-US"/>
           </a:p>
@@ -2353,7 +2354,7 @@
           <a:p>
             <a:fld id="{652F1E81-1D68-4626-9ECC-923EDADFDCD3}" type="datetimeFigureOut">
               <a:rPr lang="en-US" smtClean="0"/>
-              <a:t>11/15/2017</a:t>
+              <a:t>12/13/2017</a:t>
             </a:fld>
             <a:endParaRPr lang="en-US"/>
           </a:p>
@@ -2566,7 +2567,7 @@
           <a:p>
             <a:fld id="{652F1E81-1D68-4626-9ECC-923EDADFDCD3}" type="datetimeFigureOut">
               <a:rPr lang="en-US" smtClean="0"/>
-              <a:t>11/15/2017</a:t>
+              <a:t>12/13/2017</a:t>
             </a:fld>
             <a:endParaRPr lang="en-US"/>
           </a:p>
@@ -2971,6 +2972,565 @@
           <a:chExt cx="0" cy="0"/>
         </a:xfrm>
       </p:grpSpPr>
+      <p:pic>
+        <p:nvPicPr>
+          <p:cNvPr id="22" name="Picture 2"/>
+          <p:cNvPicPr>
+            <a:picLocks noChangeAspect="1" noChangeArrowheads="1"/>
+          </p:cNvPicPr>
+          <p:nvPr/>
+        </p:nvPicPr>
+        <p:blipFill>
+          <a:blip r:embed="rId2" cstate="email">
+            <a:extLst>
+              <a:ext uri="{28A0092B-C50C-407E-A947-70E740481C1C}">
+                <a14:useLocalDpi xmlns:a14="http://schemas.microsoft.com/office/drawing/2010/main"/>
+              </a:ext>
+            </a:extLst>
+          </a:blip>
+          <a:srcRect/>
+          <a:stretch>
+            <a:fillRect/>
+          </a:stretch>
+        </p:blipFill>
+        <p:spPr bwMode="auto">
+          <a:xfrm>
+            <a:off x="803393" y="541648"/>
+            <a:ext cx="3762980" cy="2909676"/>
+          </a:xfrm>
+          <a:prstGeom prst="rect">
+            <a:avLst/>
+          </a:prstGeom>
+          <a:noFill/>
+          <a:ln>
+            <a:noFill/>
+          </a:ln>
+          <a:extLst>
+            <a:ext uri="{909E8E84-426E-40dd-AFC4-6F175D3DCCD1}">
+              <a14:hiddenFill xmlns:a14="http://schemas.microsoft.com/office/drawing/2010/main" xmlns="">
+                <a:solidFill>
+                  <a:schemeClr val="accent1"/>
+                </a:solidFill>
+              </a14:hiddenFill>
+            </a:ext>
+            <a:ext uri="{91240B29-F687-4f45-9708-019B960494DF}">
+              <a14:hiddenLine xmlns:a14="http://schemas.microsoft.com/office/drawing/2010/main" xmlns="" w="9525">
+                <a:solidFill>
+                  <a:schemeClr val="tx1"/>
+                </a:solidFill>
+                <a:miter lim="800000"/>
+                <a:headEnd/>
+                <a:tailEnd/>
+              </a14:hiddenLine>
+            </a:ext>
+          </a:extLst>
+        </p:spPr>
+      </p:pic>
+      <p:sp>
+        <p:nvSpPr>
+          <p:cNvPr id="2" name="TextBox 1"/>
+          <p:cNvSpPr txBox="1"/>
+          <p:nvPr/>
+        </p:nvSpPr>
+        <p:spPr>
+          <a:xfrm>
+            <a:off x="882221" y="172316"/>
+            <a:ext cx="3763594" cy="369332"/>
+          </a:xfrm>
+          <a:prstGeom prst="rect">
+            <a:avLst/>
+          </a:prstGeom>
+          <a:noFill/>
+        </p:spPr>
+        <p:txBody>
+          <a:bodyPr wrap="none" rtlCol="0">
+            <a:spAutoFit/>
+          </a:bodyPr>
+          <a:lstStyle/>
+          <a:p>
+            <a:r>
+              <a:rPr lang="en-US" dirty="0" smtClean="0"/>
+              <a:t>Precipitation-Runoff Modeling (PRMS)</a:t>
+            </a:r>
+            <a:endParaRPr lang="en-US" dirty="0"/>
+          </a:p>
+        </p:txBody>
+      </p:sp>
+      <p:pic>
+        <p:nvPicPr>
+          <p:cNvPr id="23" name="Picture 4"/>
+          <p:cNvPicPr>
+            <a:picLocks noChangeAspect="1" noChangeArrowheads="1"/>
+          </p:cNvPicPr>
+          <p:nvPr/>
+        </p:nvPicPr>
+        <p:blipFill>
+          <a:blip r:embed="rId3" cstate="email">
+            <a:extLst>
+              <a:ext uri="{28A0092B-C50C-407E-A947-70E740481C1C}">
+                <a14:useLocalDpi xmlns:a14="http://schemas.microsoft.com/office/drawing/2010/main"/>
+              </a:ext>
+            </a:extLst>
+          </a:blip>
+          <a:srcRect/>
+          <a:stretch>
+            <a:fillRect/>
+          </a:stretch>
+        </p:blipFill>
+        <p:spPr bwMode="auto">
+          <a:xfrm>
+            <a:off x="5995148" y="541648"/>
+            <a:ext cx="3686175" cy="2914295"/>
+          </a:xfrm>
+          <a:prstGeom prst="rect">
+            <a:avLst/>
+          </a:prstGeom>
+          <a:noFill/>
+          <a:ln>
+            <a:noFill/>
+          </a:ln>
+          <a:extLst>
+            <a:ext uri="{909E8E84-426E-40dd-AFC4-6F175D3DCCD1}">
+              <a14:hiddenFill xmlns:a14="http://schemas.microsoft.com/office/drawing/2010/main" xmlns="">
+                <a:solidFill>
+                  <a:schemeClr val="accent1"/>
+                </a:solidFill>
+              </a14:hiddenFill>
+            </a:ext>
+            <a:ext uri="{91240B29-F687-4f45-9708-019B960494DF}">
+              <a14:hiddenLine xmlns:a14="http://schemas.microsoft.com/office/drawing/2010/main" xmlns="" w="9525">
+                <a:solidFill>
+                  <a:schemeClr val="tx1"/>
+                </a:solidFill>
+                <a:miter lim="800000"/>
+                <a:headEnd/>
+                <a:tailEnd/>
+              </a14:hiddenLine>
+            </a:ext>
+          </a:extLst>
+        </p:spPr>
+      </p:pic>
+      <p:sp>
+        <p:nvSpPr>
+          <p:cNvPr id="24" name="TextBox 23"/>
+          <p:cNvSpPr txBox="1"/>
+          <p:nvPr/>
+        </p:nvSpPr>
+        <p:spPr>
+          <a:xfrm>
+            <a:off x="6025901" y="172316"/>
+            <a:ext cx="3379451" cy="369332"/>
+          </a:xfrm>
+          <a:prstGeom prst="rect">
+            <a:avLst/>
+          </a:prstGeom>
+          <a:noFill/>
+        </p:spPr>
+        <p:txBody>
+          <a:bodyPr wrap="none" rtlCol="0">
+            <a:spAutoFit/>
+          </a:bodyPr>
+          <a:lstStyle/>
+          <a:p>
+            <a:r>
+              <a:rPr lang="en-US" dirty="0" smtClean="0"/>
+              <a:t>Streamflow Routing Package (SFR)</a:t>
+            </a:r>
+            <a:endParaRPr lang="en-US" dirty="0"/>
+          </a:p>
+        </p:txBody>
+      </p:sp>
+      <p:cxnSp>
+        <p:nvCxnSpPr>
+          <p:cNvPr id="7" name="Straight Arrow Connector 6"/>
+          <p:cNvCxnSpPr>
+            <a:stCxn id="22" idx="3"/>
+            <a:endCxn id="23" idx="1"/>
+          </p:cNvCxnSpPr>
+          <p:nvPr/>
+        </p:nvCxnSpPr>
+        <p:spPr>
+          <a:xfrm>
+            <a:off x="4566373" y="1996486"/>
+            <a:ext cx="1428775" cy="2310"/>
+          </a:xfrm>
+          <a:prstGeom prst="straightConnector1">
+            <a:avLst/>
+          </a:prstGeom>
+          <a:ln>
+            <a:tailEnd type="triangle"/>
+          </a:ln>
+        </p:spPr>
+        <p:style>
+          <a:lnRef idx="1">
+            <a:schemeClr val="accent1"/>
+          </a:lnRef>
+          <a:fillRef idx="0">
+            <a:schemeClr val="accent1"/>
+          </a:fillRef>
+          <a:effectRef idx="0">
+            <a:schemeClr val="accent1"/>
+          </a:effectRef>
+          <a:fontRef idx="minor">
+            <a:schemeClr val="tx1"/>
+          </a:fontRef>
+        </p:style>
+      </p:cxnSp>
+      <p:pic>
+        <p:nvPicPr>
+          <p:cNvPr id="25" name="Picture 5"/>
+          <p:cNvPicPr>
+            <a:picLocks noChangeAspect="1" noChangeArrowheads="1"/>
+          </p:cNvPicPr>
+          <p:nvPr/>
+        </p:nvPicPr>
+        <p:blipFill>
+          <a:blip r:embed="rId4" cstate="email">
+            <a:extLst>
+              <a:ext uri="{28A0092B-C50C-407E-A947-70E740481C1C}">
+                <a14:useLocalDpi xmlns:a14="http://schemas.microsoft.com/office/drawing/2010/main"/>
+              </a:ext>
+            </a:extLst>
+          </a:blip>
+          <a:srcRect/>
+          <a:stretch>
+            <a:fillRect/>
+          </a:stretch>
+        </p:blipFill>
+        <p:spPr bwMode="auto">
+          <a:xfrm>
+            <a:off x="3358169" y="3946780"/>
+            <a:ext cx="3845181" cy="3028649"/>
+          </a:xfrm>
+          <a:prstGeom prst="rect">
+            <a:avLst/>
+          </a:prstGeom>
+          <a:noFill/>
+          <a:ln>
+            <a:noFill/>
+          </a:ln>
+          <a:extLst>
+            <a:ext uri="{909E8E84-426E-40dd-AFC4-6F175D3DCCD1}">
+              <a14:hiddenFill xmlns:a14="http://schemas.microsoft.com/office/drawing/2010/main" xmlns="">
+                <a:solidFill>
+                  <a:schemeClr val="accent1"/>
+                </a:solidFill>
+              </a14:hiddenFill>
+            </a:ext>
+            <a:ext uri="{91240B29-F687-4f45-9708-019B960494DF}">
+              <a14:hiddenLine xmlns:a14="http://schemas.microsoft.com/office/drawing/2010/main" xmlns="" w="9525">
+                <a:solidFill>
+                  <a:schemeClr val="tx1"/>
+                </a:solidFill>
+                <a:miter lim="800000"/>
+                <a:headEnd/>
+                <a:tailEnd/>
+              </a14:hiddenLine>
+            </a:ext>
+          </a:extLst>
+        </p:spPr>
+      </p:pic>
+      <p:sp>
+        <p:nvSpPr>
+          <p:cNvPr id="27" name="TextBox 26"/>
+          <p:cNvSpPr txBox="1"/>
+          <p:nvPr/>
+        </p:nvSpPr>
+        <p:spPr>
+          <a:xfrm>
+            <a:off x="3289090" y="3582067"/>
+            <a:ext cx="3877343" cy="369332"/>
+          </a:xfrm>
+          <a:prstGeom prst="rect">
+            <a:avLst/>
+          </a:prstGeom>
+          <a:noFill/>
+        </p:spPr>
+        <p:txBody>
+          <a:bodyPr wrap="none" rtlCol="0">
+            <a:spAutoFit/>
+          </a:bodyPr>
+          <a:lstStyle/>
+          <a:p>
+            <a:r>
+              <a:rPr lang="en-US" dirty="0" smtClean="0"/>
+              <a:t>Irrigation on to PRMS HRUs or UZF cells</a:t>
+            </a:r>
+            <a:endParaRPr lang="en-US" dirty="0"/>
+          </a:p>
+        </p:txBody>
+      </p:sp>
+      <p:cxnSp>
+        <p:nvCxnSpPr>
+          <p:cNvPr id="10" name="Straight Arrow Connector 9"/>
+          <p:cNvCxnSpPr/>
+          <p:nvPr/>
+        </p:nvCxnSpPr>
+        <p:spPr>
+          <a:xfrm>
+            <a:off x="8056179" y="3451324"/>
+            <a:ext cx="31531" cy="1853773"/>
+          </a:xfrm>
+          <a:prstGeom prst="straightConnector1">
+            <a:avLst/>
+          </a:prstGeom>
+          <a:ln>
+            <a:headEnd type="none" w="med" len="med"/>
+            <a:tailEnd type="none" w="med" len="med"/>
+          </a:ln>
+        </p:spPr>
+        <p:style>
+          <a:lnRef idx="1">
+            <a:schemeClr val="accent1"/>
+          </a:lnRef>
+          <a:fillRef idx="0">
+            <a:schemeClr val="accent1"/>
+          </a:fillRef>
+          <a:effectRef idx="0">
+            <a:schemeClr val="accent1"/>
+          </a:effectRef>
+          <a:fontRef idx="minor">
+            <a:schemeClr val="tx1"/>
+          </a:fontRef>
+        </p:style>
+      </p:cxnSp>
+      <p:sp>
+        <p:nvSpPr>
+          <p:cNvPr id="11" name="TextBox 10"/>
+          <p:cNvSpPr txBox="1"/>
+          <p:nvPr/>
+        </p:nvSpPr>
+        <p:spPr>
+          <a:xfrm>
+            <a:off x="4684507" y="1350155"/>
+            <a:ext cx="1192506" cy="646331"/>
+          </a:xfrm>
+          <a:prstGeom prst="rect">
+            <a:avLst/>
+          </a:prstGeom>
+          <a:noFill/>
+        </p:spPr>
+        <p:txBody>
+          <a:bodyPr wrap="none" rtlCol="0">
+            <a:spAutoFit/>
+          </a:bodyPr>
+          <a:lstStyle/>
+          <a:p>
+            <a:r>
+              <a:rPr lang="en-US" dirty="0" smtClean="0"/>
+              <a:t>Drainage</a:t>
+            </a:r>
+          </a:p>
+          <a:p>
+            <a:r>
+              <a:rPr lang="en-US" dirty="0" smtClean="0"/>
+              <a:t>to streams</a:t>
+            </a:r>
+            <a:endParaRPr lang="en-US" dirty="0"/>
+          </a:p>
+        </p:txBody>
+      </p:sp>
+      <p:cxnSp>
+        <p:nvCxnSpPr>
+          <p:cNvPr id="15" name="Straight Arrow Connector 14"/>
+          <p:cNvCxnSpPr/>
+          <p:nvPr/>
+        </p:nvCxnSpPr>
+        <p:spPr>
+          <a:xfrm flipH="1">
+            <a:off x="7203350" y="5305097"/>
+            <a:ext cx="884360" cy="0"/>
+          </a:xfrm>
+          <a:prstGeom prst="straightConnector1">
+            <a:avLst/>
+          </a:prstGeom>
+          <a:ln>
+            <a:tailEnd type="triangle"/>
+          </a:ln>
+        </p:spPr>
+        <p:style>
+          <a:lnRef idx="1">
+            <a:schemeClr val="accent1"/>
+          </a:lnRef>
+          <a:fillRef idx="0">
+            <a:schemeClr val="accent1"/>
+          </a:fillRef>
+          <a:effectRef idx="0">
+            <a:schemeClr val="accent1"/>
+          </a:effectRef>
+          <a:fontRef idx="minor">
+            <a:schemeClr val="tx1"/>
+          </a:fontRef>
+        </p:style>
+      </p:cxnSp>
+      <p:sp>
+        <p:nvSpPr>
+          <p:cNvPr id="16" name="TextBox 15"/>
+          <p:cNvSpPr txBox="1"/>
+          <p:nvPr/>
+        </p:nvSpPr>
+        <p:spPr>
+          <a:xfrm>
+            <a:off x="8071944" y="3979607"/>
+            <a:ext cx="2817503" cy="646331"/>
+          </a:xfrm>
+          <a:prstGeom prst="rect">
+            <a:avLst/>
+          </a:prstGeom>
+          <a:noFill/>
+        </p:spPr>
+        <p:txBody>
+          <a:bodyPr wrap="none" rtlCol="0">
+            <a:spAutoFit/>
+          </a:bodyPr>
+          <a:lstStyle/>
+          <a:p>
+            <a:r>
+              <a:rPr lang="en-US" dirty="0" smtClean="0"/>
+              <a:t>SW diversions/GW pumping</a:t>
+            </a:r>
+          </a:p>
+          <a:p>
+            <a:r>
+              <a:rPr lang="en-US" dirty="0" smtClean="0"/>
+              <a:t>For irrigation</a:t>
+            </a:r>
+            <a:endParaRPr lang="en-US" dirty="0"/>
+          </a:p>
+        </p:txBody>
+      </p:sp>
+    </p:spTree>
+    <p:extLst>
+      <p:ext uri="{BB962C8B-B14F-4D97-AF65-F5344CB8AC3E}">
+        <p14:creationId xmlns:p14="http://schemas.microsoft.com/office/powerpoint/2010/main" val="3448900807"/>
+      </p:ext>
+    </p:extLst>
+  </p:cSld>
+  <p:clrMapOvr>
+    <a:masterClrMapping/>
+  </p:clrMapOvr>
+  <p:timing>
+    <p:tnLst>
+      <p:par>
+        <p:cTn id="1" dur="indefinite" restart="never" nodeType="tmRoot">
+          <p:childTnLst>
+            <p:seq concurrent="1" nextAc="seek">
+              <p:cTn id="2" dur="indefinite" nodeType="mainSeq">
+                <p:childTnLst>
+                  <p:par>
+                    <p:cTn id="3" fill="hold">
+                      <p:stCondLst>
+                        <p:cond delay="indefinite"/>
+                      </p:stCondLst>
+                      <p:childTnLst>
+                        <p:par>
+                          <p:cTn id="4" fill="hold">
+                            <p:stCondLst>
+                              <p:cond delay="0"/>
+                            </p:stCondLst>
+                            <p:childTnLst>
+                              <p:par>
+                                <p:cTn id="5" presetID="1" presetClass="entr" presetSubtype="0" fill="hold" nodeType="clickEffect">
+                                  <p:stCondLst>
+                                    <p:cond delay="0"/>
+                                  </p:stCondLst>
+                                  <p:childTnLst>
+                                    <p:set>
+                                      <p:cBhvr>
+                                        <p:cTn id="6" dur="1" fill="hold">
+                                          <p:stCondLst>
+                                            <p:cond delay="0"/>
+                                          </p:stCondLst>
+                                        </p:cTn>
+                                        <p:tgtEl>
+                                          <p:spTgt spid="23"/>
+                                        </p:tgtEl>
+                                        <p:attrNameLst>
+                                          <p:attrName>style.visibility</p:attrName>
+                                        </p:attrNameLst>
+                                      </p:cBhvr>
+                                      <p:to>
+                                        <p:strVal val="visible"/>
+                                      </p:to>
+                                    </p:set>
+                                  </p:childTnLst>
+                                </p:cTn>
+                              </p:par>
+                              <p:par>
+                                <p:cTn id="7" presetID="1" presetClass="entr" presetSubtype="0" fill="hold" nodeType="withEffect">
+                                  <p:stCondLst>
+                                    <p:cond delay="0"/>
+                                  </p:stCondLst>
+                                  <p:childTnLst>
+                                    <p:set>
+                                      <p:cBhvr>
+                                        <p:cTn id="8" dur="1" fill="hold">
+                                          <p:stCondLst>
+                                            <p:cond delay="0"/>
+                                          </p:stCondLst>
+                                        </p:cTn>
+                                        <p:tgtEl>
+                                          <p:spTgt spid="25"/>
+                                        </p:tgtEl>
+                                        <p:attrNameLst>
+                                          <p:attrName>style.visibility</p:attrName>
+                                        </p:attrNameLst>
+                                      </p:cBhvr>
+                                      <p:to>
+                                        <p:strVal val="visible"/>
+                                      </p:to>
+                                    </p:set>
+                                  </p:childTnLst>
+                                </p:cTn>
+                              </p:par>
+                            </p:childTnLst>
+                          </p:cTn>
+                        </p:par>
+                      </p:childTnLst>
+                    </p:cTn>
+                  </p:par>
+                </p:childTnLst>
+              </p:cTn>
+              <p:prevCondLst>
+                <p:cond evt="onPrev" delay="0">
+                  <p:tgtEl>
+                    <p:sldTgt/>
+                  </p:tgtEl>
+                </p:cond>
+              </p:prevCondLst>
+              <p:nextCondLst>
+                <p:cond evt="onNext" delay="0">
+                  <p:tgtEl>
+                    <p:sldTgt/>
+                  </p:tgtEl>
+                </p:cond>
+              </p:nextCondLst>
+            </p:seq>
+          </p:childTnLst>
+        </p:cTn>
+      </p:par>
+    </p:tnLst>
+  </p:timing>
+</p:sld>
+</file>
+
+<file path=ppt/slides/slide2.xml><?xml version="1.0" encoding="utf-8"?>
+<p:sld xmlns:a="http://schemas.openxmlformats.org/drawingml/2006/main" xmlns:r="http://schemas.openxmlformats.org/officeDocument/2006/relationships" xmlns:p="http://schemas.openxmlformats.org/presentationml/2006/main">
+  <p:cSld>
+    <p:spTree>
+      <p:nvGrpSpPr>
+        <p:cNvPr id="1" name=""/>
+        <p:cNvGrpSpPr/>
+        <p:nvPr/>
+      </p:nvGrpSpPr>
+      <p:grpSpPr>
+        <a:xfrm>
+          <a:off x="0" y="0"/>
+          <a:ext cx="0" cy="0"/>
+          <a:chOff x="0" y="0"/>
+          <a:chExt cx="0" cy="0"/>
+        </a:xfrm>
+      </p:grpSpPr>
       <p:sp>
         <p:nvSpPr>
           <p:cNvPr id="4" name="Rectangle 3"/>
@@ -3290,7 +3850,15 @@
             </a:r>
             <a:r>
               <a:rPr lang="en-US" sz="1400" dirty="0" smtClean="0"/>
-              <a:t> calculated in AGO using efficiency factor</a:t>
+              <a:t> calculated in </a:t>
+            </a:r>
+            <a:r>
+              <a:rPr lang="en-US" sz="1400" dirty="0" smtClean="0"/>
+              <a:t>AWU </a:t>
+            </a:r>
+            <a:r>
+              <a:rPr lang="en-US" sz="1400" dirty="0" smtClean="0"/>
+              <a:t>using efficiency factor</a:t>
             </a:r>
           </a:p>
           <a:p>
@@ -3660,7 +4228,7 @@
     </p:spTree>
     <p:extLst>
       <p:ext uri="{BB962C8B-B14F-4D97-AF65-F5344CB8AC3E}">
-        <p14:creationId xmlns:p14="http://schemas.microsoft.com/office/powerpoint/2010/main" val="3448900807"/>
+        <p14:creationId xmlns:p14="http://schemas.microsoft.com/office/powerpoint/2010/main" val="718109826"/>
       </p:ext>
     </p:extLst>
   </p:cSld>
@@ -3670,7 +4238,7 @@
 </p:sld>
 </file>
 
-<file path=ppt/slides/slide2.xml><?xml version="1.0" encoding="utf-8"?>
+<file path=ppt/slides/slide3.xml><?xml version="1.0" encoding="utf-8"?>
 <p:sld xmlns:a="http://schemas.openxmlformats.org/drawingml/2006/main" xmlns:r="http://schemas.openxmlformats.org/officeDocument/2006/relationships" xmlns:p="http://schemas.openxmlformats.org/presentationml/2006/main">
   <p:cSld>
     <p:spTree>
@@ -4827,7 +5395,7 @@
 </p:sld>
 </file>
 
-<file path=ppt/slides/slide3.xml><?xml version="1.0" encoding="utf-8"?>
+<file path=ppt/slides/slide4.xml><?xml version="1.0" encoding="utf-8"?>
 <p:sld xmlns:a="http://schemas.openxmlformats.org/drawingml/2006/main" xmlns:r="http://schemas.openxmlformats.org/officeDocument/2006/relationships" xmlns:p="http://schemas.openxmlformats.org/presentationml/2006/main">
   <p:cSld>
     <p:spTree>
@@ -5307,11 +5875,7 @@
           <a:p>
             <a:r>
               <a:rPr lang="en-US" sz="1200" dirty="0" smtClean="0"/>
-              <a:t>Diversion less than </a:t>
-            </a:r>
-            <a:r>
-              <a:rPr lang="en-US" sz="1200" dirty="0" smtClean="0"/>
-              <a:t>demand with supplemental GW rights</a:t>
+              <a:t>Diversion less than demand with supplemental GW rights</a:t>
             </a:r>
             <a:endParaRPr lang="en-US" sz="1200" dirty="0"/>
           </a:p>

</xml_diff>